<commit_message>
Major Changes: Inserted Profile Pic here in the Presentation. Next reformated and corrected some elements here in README.md
Signed-off-by: RISHIT GHOSH <rishitghosh06@gmail.com>
</commit_message>
<xml_diff>
--- a/presentation/Student_Marks_Result_Analysis_MS-ELEVATE_POWER-BI_PROJECT_PRESENTATION_RISHIT-GHOSH.pptx
+++ b/presentation/Student_Marks_Result_Analysis_MS-ELEVATE_POWER-BI_PROJECT_PRESENTATION_RISHIT-GHOSH.pptx
@@ -234,7 +234,7 @@
           <a:p>
             <a:fld id="{11699836-02B7-459A-AF64-A000817D576C}" type="datetimeFigureOut">
               <a:rPr lang="en-IN" smtClean="0"/>
-              <a:t>15 January 2026</a:t>
+              <a:t>19 January 2026</a:t>
             </a:fld>
             <a:endParaRPr lang="en-IN"/>
           </a:p>
@@ -918,7 +918,7 @@
           <a:p>
             <a:fld id="{CB3FA99E-0146-4BD9-9E30-4EB71F3A4207}" type="datetimeFigureOut">
               <a:rPr lang="en-IN" smtClean="0"/>
-              <a:t>15 January 2026</a:t>
+              <a:t>19 January 2026</a:t>
             </a:fld>
             <a:endParaRPr lang="en-IN"/>
           </a:p>
@@ -1025,7 +1025,7 @@
           <a:p>
             <a:fld id="{4EDE50D6-574B-40AF-946F-D52A04ADE379}" type="datetime1">
               <a:rPr lang="en-US" smtClean="0"/>
-              <a:t>1/15/2026</a:t>
+              <a:t>1/19/2026</a:t>
             </a:fld>
             <a:endParaRPr lang="en-US"/>
           </a:p>
@@ -1223,7 +1223,7 @@
           <a:p>
             <a:fld id="{846CE7D5-CF57-46EF-B807-FDD0502418D4}" type="datetimeFigureOut">
               <a:rPr lang="en-GB" smtClean="0"/>
-              <a:t>15/01/2026</a:t>
+              <a:t>19/01/2026</a:t>
             </a:fld>
             <a:endParaRPr lang="en-GB"/>
           </a:p>
@@ -3199,7 +3199,7 @@
           </p:cNvPicPr>
           <p:nvPr/>
         </p:nvPicPr>
-        <p:blipFill rotWithShape="1">
+        <p:blipFill>
           <a:blip r:embed="rId5">
             <a:extLst>
               <a:ext uri="{28A0092B-C50C-407E-A947-70E740481C1C}">
@@ -3207,15 +3207,15 @@
               </a:ext>
             </a:extLst>
           </a:blip>
-          <a:srcRect l="3105" t="3736" r="4094" b="4192"/>
+          <a:srcRect t="5072" b="26439"/>
           <a:stretch>
             <a:fillRect/>
           </a:stretch>
         </p:blipFill>
         <p:spPr>
           <a:xfrm>
-            <a:off x="6951630" y="1147482"/>
-            <a:ext cx="3470520" cy="4545104"/>
+            <a:off x="6951630" y="1343054"/>
+            <a:ext cx="3470520" cy="3919228"/>
           </a:xfrm>
           <a:prstGeom prst="rect">
             <a:avLst/>
@@ -3395,9 +3395,25 @@
               </a:rPr>
               <a:t>Link</a:t>
             </a:r>
-            <a:endParaRPr lang="en-IN" sz="2200" dirty="0">
-              <a:latin typeface="Franklin Gothic Book"/>
-            </a:endParaRPr>
+            <a:r>
+              <a:rPr lang="en-IN" sz="2200" dirty="0">
+                <a:latin typeface="Franklin Gothic Book"/>
+              </a:rPr>
+              <a:t> [</a:t>
+            </a:r>
+            <a:r>
+              <a:rPr lang="en-IN" sz="2200" dirty="0">
+                <a:latin typeface="Franklin Gothic Book"/>
+                <a:hlinkClick r:id="rId3"/>
+              </a:rPr>
+              <a:t>https://github.com/rajghosh06-dev/student-performance-dashboard</a:t>
+            </a:r>
+            <a:r>
+              <a:rPr lang="en-IN" sz="2200" dirty="0">
+                <a:latin typeface="Franklin Gothic Book"/>
+              </a:rPr>
+              <a:t>]</a:t>
+            </a:r>
           </a:p>
         </p:txBody>
       </p:sp>

</xml_diff>